<commit_message>
Updated the wireframe of the Admin.
</commit_message>
<xml_diff>
--- a/materials/documentation/eDyscalculia App Wireframe - Admin.pptx
+++ b/materials/documentation/eDyscalculia App Wireframe - Admin.pptx
@@ -5,14 +5,15 @@
     <p:sldMasterId id="2147483648" r:id="rId1"/>
   </p:sldMasterIdLst>
   <p:notesMasterIdLst>
-    <p:notesMasterId r:id="rId7"/>
+    <p:notesMasterId r:id="rId8"/>
   </p:notesMasterIdLst>
   <p:sldIdLst>
     <p:sldId id="260" r:id="rId2"/>
     <p:sldId id="262" r:id="rId3"/>
     <p:sldId id="261" r:id="rId4"/>
     <p:sldId id="264" r:id="rId5"/>
-    <p:sldId id="265" r:id="rId6"/>
+    <p:sldId id="266" r:id="rId6"/>
+    <p:sldId id="265" r:id="rId7"/>
   </p:sldIdLst>
   <p:sldSz cx="12192000" cy="6858000"/>
   <p:notesSz cx="6858000" cy="9144000"/>
@@ -134,6 +135,11 @@
             <p14:sldId id="264"/>
           </p14:sldIdLst>
         </p14:section>
+        <p14:section name="Chapter Page" id="{1D0A677A-0B37-4E25-A8C2-AC3C3EFB35C8}">
+          <p14:sldIdLst>
+            <p14:sldId id="266"/>
+          </p14:sldIdLst>
+        </p14:section>
         <p14:section name="Post Test / Pre Test / Activity Page" id="{FD72A026-287A-4AAD-9FF7-0A030A3C3690}">
           <p14:sldIdLst>
             <p14:sldId id="265"/>
@@ -230,7 +236,7 @@
           <a:p>
             <a:fld id="{101881B7-76EF-4B04-9C34-D3583E3944EF}" type="datetimeFigureOut">
               <a:rPr lang="en-PH" smtClean="0"/>
-              <a:t>1/12/2018</a:t>
+              <a:t>1/15/2018</a:t>
             </a:fld>
             <a:endParaRPr lang="en-PH"/>
           </a:p>
@@ -629,7 +635,7 @@
           <a:p>
             <a:fld id="{D1C7A99B-1870-45E6-A2F7-F806AAA7BFA2}" type="datetimeFigureOut">
               <a:rPr lang="en-PH" smtClean="0"/>
-              <a:t>1/12/2018</a:t>
+              <a:t>1/15/2018</a:t>
             </a:fld>
             <a:endParaRPr lang="en-PH"/>
           </a:p>
@@ -799,7 +805,7 @@
           <a:p>
             <a:fld id="{D1C7A99B-1870-45E6-A2F7-F806AAA7BFA2}" type="datetimeFigureOut">
               <a:rPr lang="en-PH" smtClean="0"/>
-              <a:t>1/12/2018</a:t>
+              <a:t>1/15/2018</a:t>
             </a:fld>
             <a:endParaRPr lang="en-PH"/>
           </a:p>
@@ -979,7 +985,7 @@
           <a:p>
             <a:fld id="{D1C7A99B-1870-45E6-A2F7-F806AAA7BFA2}" type="datetimeFigureOut">
               <a:rPr lang="en-PH" smtClean="0"/>
-              <a:t>1/12/2018</a:t>
+              <a:t>1/15/2018</a:t>
             </a:fld>
             <a:endParaRPr lang="en-PH"/>
           </a:p>
@@ -1149,7 +1155,7 @@
           <a:p>
             <a:fld id="{D1C7A99B-1870-45E6-A2F7-F806AAA7BFA2}" type="datetimeFigureOut">
               <a:rPr lang="en-PH" smtClean="0"/>
-              <a:t>1/12/2018</a:t>
+              <a:t>1/15/2018</a:t>
             </a:fld>
             <a:endParaRPr lang="en-PH"/>
           </a:p>
@@ -1395,7 +1401,7 @@
           <a:p>
             <a:fld id="{D1C7A99B-1870-45E6-A2F7-F806AAA7BFA2}" type="datetimeFigureOut">
               <a:rPr lang="en-PH" smtClean="0"/>
-              <a:t>1/12/2018</a:t>
+              <a:t>1/15/2018</a:t>
             </a:fld>
             <a:endParaRPr lang="en-PH"/>
           </a:p>
@@ -1627,7 +1633,7 @@
           <a:p>
             <a:fld id="{D1C7A99B-1870-45E6-A2F7-F806AAA7BFA2}" type="datetimeFigureOut">
               <a:rPr lang="en-PH" smtClean="0"/>
-              <a:t>1/12/2018</a:t>
+              <a:t>1/15/2018</a:t>
             </a:fld>
             <a:endParaRPr lang="en-PH"/>
           </a:p>
@@ -1994,7 +2000,7 @@
           <a:p>
             <a:fld id="{D1C7A99B-1870-45E6-A2F7-F806AAA7BFA2}" type="datetimeFigureOut">
               <a:rPr lang="en-PH" smtClean="0"/>
-              <a:t>1/12/2018</a:t>
+              <a:t>1/15/2018</a:t>
             </a:fld>
             <a:endParaRPr lang="en-PH"/>
           </a:p>
@@ -2112,7 +2118,7 @@
           <a:p>
             <a:fld id="{D1C7A99B-1870-45E6-A2F7-F806AAA7BFA2}" type="datetimeFigureOut">
               <a:rPr lang="en-PH" smtClean="0"/>
-              <a:t>1/12/2018</a:t>
+              <a:t>1/15/2018</a:t>
             </a:fld>
             <a:endParaRPr lang="en-PH"/>
           </a:p>
@@ -2207,7 +2213,7 @@
           <a:p>
             <a:fld id="{D1C7A99B-1870-45E6-A2F7-F806AAA7BFA2}" type="datetimeFigureOut">
               <a:rPr lang="en-PH" smtClean="0"/>
-              <a:t>1/12/2018</a:t>
+              <a:t>1/15/2018</a:t>
             </a:fld>
             <a:endParaRPr lang="en-PH"/>
           </a:p>
@@ -2484,7 +2490,7 @@
           <a:p>
             <a:fld id="{D1C7A99B-1870-45E6-A2F7-F806AAA7BFA2}" type="datetimeFigureOut">
               <a:rPr lang="en-PH" smtClean="0"/>
-              <a:t>1/12/2018</a:t>
+              <a:t>1/15/2018</a:t>
             </a:fld>
             <a:endParaRPr lang="en-PH"/>
           </a:p>
@@ -2737,7 +2743,7 @@
           <a:p>
             <a:fld id="{D1C7A99B-1870-45E6-A2F7-F806AAA7BFA2}" type="datetimeFigureOut">
               <a:rPr lang="en-PH" smtClean="0"/>
-              <a:t>1/12/2018</a:t>
+              <a:t>1/15/2018</a:t>
             </a:fld>
             <a:endParaRPr lang="en-PH"/>
           </a:p>
@@ -2950,7 +2956,7 @@
           <a:p>
             <a:fld id="{D1C7A99B-1870-45E6-A2F7-F806AAA7BFA2}" type="datetimeFigureOut">
               <a:rPr lang="en-PH" smtClean="0"/>
-              <a:t>1/12/2018</a:t>
+              <a:t>1/15/2018</a:t>
             </a:fld>
             <a:endParaRPr lang="en-PH"/>
           </a:p>
@@ -4646,7 +4652,7 @@
         <p:spPr>
           <a:xfrm>
             <a:off x="4906296" y="1422153"/>
-            <a:ext cx="821059" cy="369332"/>
+            <a:ext cx="931345" cy="369332"/>
           </a:xfrm>
           <a:prstGeom prst="rect">
             <a:avLst/>
@@ -4661,7 +4667,7 @@
           <a:p>
             <a:r>
               <a:rPr lang="en-PH" dirty="0" smtClean="0"/>
-              <a:t>Lesson</a:t>
+              <a:t>Chapter</a:t>
             </a:r>
             <a:endParaRPr lang="en-PH" dirty="0"/>
           </a:p>
@@ -4713,7 +4719,7 @@
         <p:spPr>
           <a:xfrm>
             <a:off x="4906296" y="1791485"/>
-            <a:ext cx="919995" cy="369332"/>
+            <a:ext cx="821059" cy="369332"/>
           </a:xfrm>
           <a:prstGeom prst="rect">
             <a:avLst/>
@@ -4728,7 +4734,7 @@
           <a:p>
             <a:r>
               <a:rPr lang="en-PH" dirty="0" smtClean="0"/>
-              <a:t>Pre Test</a:t>
+              <a:t>Lesson</a:t>
             </a:r>
             <a:endParaRPr lang="en-PH" dirty="0"/>
           </a:p>
@@ -4780,7 +4786,7 @@
         <p:spPr>
           <a:xfrm>
             <a:off x="4901238" y="2181624"/>
-            <a:ext cx="1008802" cy="369332"/>
+            <a:ext cx="1037463" cy="369332"/>
           </a:xfrm>
           <a:prstGeom prst="rect">
             <a:avLst/>
@@ -4795,7 +4801,7 @@
           <a:p>
             <a:r>
               <a:rPr lang="en-PH" dirty="0" smtClean="0"/>
-              <a:t>Post Test</a:t>
+              <a:t>Activities</a:t>
             </a:r>
             <a:endParaRPr lang="en-PH" dirty="0"/>
           </a:p>
@@ -4847,7 +4853,7 @@
         <p:spPr>
           <a:xfrm>
             <a:off x="4911872" y="2598318"/>
-            <a:ext cx="1037463" cy="369332"/>
+            <a:ext cx="920380" cy="369332"/>
           </a:xfrm>
           <a:prstGeom prst="rect">
             <a:avLst/>
@@ -4862,7 +4868,7 @@
           <a:p>
             <a:r>
               <a:rPr lang="en-PH" dirty="0" smtClean="0"/>
-              <a:t>Activities</a:t>
+              <a:t>Pre-test</a:t>
             </a:r>
             <a:endParaRPr lang="en-PH" dirty="0"/>
           </a:p>
@@ -4914,7 +4920,7 @@
         <p:spPr>
           <a:xfrm>
             <a:off x="4911872" y="2962894"/>
-            <a:ext cx="1041439" cy="369332"/>
+            <a:ext cx="1009187" cy="369332"/>
           </a:xfrm>
           <a:prstGeom prst="rect">
             <a:avLst/>
@@ -4929,7 +4935,7 @@
           <a:p>
             <a:r>
               <a:rPr lang="en-PH" dirty="0" smtClean="0"/>
-              <a:t>Accounts</a:t>
+              <a:t>Post-test</a:t>
             </a:r>
             <a:endParaRPr lang="en-PH" dirty="0"/>
           </a:p>
@@ -4981,7 +4987,7 @@
         <p:spPr>
           <a:xfrm>
             <a:off x="4916129" y="3357633"/>
-            <a:ext cx="886781" cy="369332"/>
+            <a:ext cx="1041439" cy="369332"/>
           </a:xfrm>
           <a:prstGeom prst="rect">
             <a:avLst/>
@@ -4996,7 +5002,7 @@
           <a:p>
             <a:r>
               <a:rPr lang="en-PH" dirty="0" smtClean="0"/>
-              <a:t>Log out</a:t>
+              <a:t>Accounts</a:t>
             </a:r>
             <a:endParaRPr lang="en-PH" dirty="0"/>
           </a:p>
@@ -5010,7 +5016,7 @@
         </p:nvCxnSpPr>
         <p:spPr>
           <a:xfrm>
-            <a:off x="2941780" y="1611218"/>
+            <a:off x="2941780" y="1975015"/>
             <a:ext cx="2026928" cy="3092"/>
           </a:xfrm>
           <a:prstGeom prst="straightConnector1">
@@ -5043,7 +5049,7 @@
         </p:nvCxnSpPr>
         <p:spPr>
           <a:xfrm>
-            <a:off x="2937450" y="2009576"/>
+            <a:off x="2937450" y="2393031"/>
             <a:ext cx="2026928" cy="3092"/>
           </a:xfrm>
           <a:prstGeom prst="straightConnector1">
@@ -5076,7 +5082,7 @@
         </p:nvCxnSpPr>
         <p:spPr>
           <a:xfrm>
-            <a:off x="2937544" y="2374152"/>
+            <a:off x="2937544" y="2757607"/>
             <a:ext cx="2026928" cy="3092"/>
           </a:xfrm>
           <a:prstGeom prst="straightConnector1">
@@ -5109,7 +5115,7 @@
         </p:nvCxnSpPr>
         <p:spPr>
           <a:xfrm>
-            <a:off x="2937450" y="2786720"/>
+            <a:off x="2937450" y="3170175"/>
             <a:ext cx="2026928" cy="3092"/>
           </a:xfrm>
           <a:prstGeom prst="straightConnector1">
@@ -5142,7 +5148,7 @@
         </p:nvCxnSpPr>
         <p:spPr>
           <a:xfrm>
-            <a:off x="2937450" y="3156070"/>
+            <a:off x="2937450" y="3539525"/>
             <a:ext cx="2026928" cy="3092"/>
           </a:xfrm>
           <a:prstGeom prst="straightConnector1">
@@ -5175,7 +5181,7 @@
         </p:nvCxnSpPr>
         <p:spPr>
           <a:xfrm>
-            <a:off x="2936204" y="3519403"/>
+            <a:off x="2936204" y="3902858"/>
             <a:ext cx="2026928" cy="3092"/>
           </a:xfrm>
           <a:prstGeom prst="straightConnector1">
@@ -5208,7 +5214,7 @@
         </p:nvSpPr>
         <p:spPr>
           <a:xfrm>
-            <a:off x="95042" y="1391473"/>
+            <a:off x="95042" y="1774928"/>
             <a:ext cx="2870658" cy="369332"/>
           </a:xfrm>
           <a:prstGeom prst="rect">
@@ -5238,7 +5244,7 @@
         </p:nvSpPr>
         <p:spPr>
           <a:xfrm>
-            <a:off x="659886" y="1776206"/>
+            <a:off x="659886" y="2159661"/>
             <a:ext cx="2229393" cy="369332"/>
           </a:xfrm>
           <a:prstGeom prst="rect">
@@ -5268,7 +5274,7 @@
         </p:nvSpPr>
         <p:spPr>
           <a:xfrm>
-            <a:off x="659886" y="2184496"/>
+            <a:off x="659886" y="2567951"/>
             <a:ext cx="2322815" cy="369332"/>
           </a:xfrm>
           <a:prstGeom prst="rect">
@@ -5298,7 +5304,7 @@
         </p:nvSpPr>
         <p:spPr>
           <a:xfrm>
-            <a:off x="627239" y="2568549"/>
+            <a:off x="627239" y="2952004"/>
             <a:ext cx="2338461" cy="369332"/>
           </a:xfrm>
           <a:prstGeom prst="rect">
@@ -5328,7 +5334,7 @@
         </p:nvSpPr>
         <p:spPr>
           <a:xfrm>
-            <a:off x="595938" y="2937168"/>
+            <a:off x="595938" y="3320623"/>
             <a:ext cx="2342436" cy="369332"/>
           </a:xfrm>
           <a:prstGeom prst="rect">
@@ -5358,7 +5364,7 @@
         </p:nvSpPr>
         <p:spPr>
           <a:xfrm>
-            <a:off x="1281456" y="3321901"/>
+            <a:off x="1281456" y="3705356"/>
             <a:ext cx="1684244" cy="369332"/>
           </a:xfrm>
           <a:prstGeom prst="rect">
@@ -5375,6 +5381,102 @@
             <a:r>
               <a:rPr lang="en-PH" dirty="0" smtClean="0"/>
               <a:t>Log out account</a:t>
+            </a:r>
+            <a:endParaRPr lang="en-PH" dirty="0"/>
+          </a:p>
+        </p:txBody>
+      </p:sp>
+      <p:sp>
+        <p:nvSpPr>
+          <p:cNvPr id="42" name="TextBox 41"/>
+          <p:cNvSpPr txBox="1"/>
+          <p:nvPr/>
+        </p:nvSpPr>
+        <p:spPr>
+          <a:xfrm>
+            <a:off x="4950545" y="3706674"/>
+            <a:ext cx="832279" cy="369332"/>
+          </a:xfrm>
+          <a:prstGeom prst="rect">
+            <a:avLst/>
+          </a:prstGeom>
+          <a:noFill/>
+        </p:spPr>
+        <p:txBody>
+          <a:bodyPr wrap="none" rtlCol="0">
+            <a:spAutoFit/>
+          </a:bodyPr>
+          <a:lstStyle/>
+          <a:p>
+            <a:r>
+              <a:rPr lang="en-PH" dirty="0" smtClean="0"/>
+              <a:t>Logout</a:t>
+            </a:r>
+          </a:p>
+        </p:txBody>
+      </p:sp>
+      <p:cxnSp>
+        <p:nvCxnSpPr>
+          <p:cNvPr id="54" name="Straight Arrow Connector 53"/>
+          <p:cNvCxnSpPr/>
+          <p:nvPr/>
+        </p:nvCxnSpPr>
+        <p:spPr>
+          <a:xfrm>
+            <a:off x="2936868" y="1606302"/>
+            <a:ext cx="2026928" cy="3092"/>
+          </a:xfrm>
+          <a:prstGeom prst="straightConnector1">
+            <a:avLst/>
+          </a:prstGeom>
+          <a:ln>
+            <a:tailEnd type="triangle"/>
+          </a:ln>
+        </p:spPr>
+        <p:style>
+          <a:lnRef idx="1">
+            <a:schemeClr val="accent1"/>
+          </a:lnRef>
+          <a:fillRef idx="0">
+            <a:schemeClr val="accent1"/>
+          </a:fillRef>
+          <a:effectRef idx="0">
+            <a:schemeClr val="accent1"/>
+          </a:effectRef>
+          <a:fontRef idx="minor">
+            <a:schemeClr val="tx1"/>
+          </a:fontRef>
+        </p:style>
+      </p:cxnSp>
+      <p:sp>
+        <p:nvSpPr>
+          <p:cNvPr id="55" name="TextBox 54"/>
+          <p:cNvSpPr txBox="1"/>
+          <p:nvPr/>
+        </p:nvSpPr>
+        <p:spPr>
+          <a:xfrm>
+            <a:off x="758728" y="1406215"/>
+            <a:ext cx="2229136" cy="369332"/>
+          </a:xfrm>
+          <a:prstGeom prst="rect">
+            <a:avLst/>
+          </a:prstGeom>
+          <a:noFill/>
+        </p:spPr>
+        <p:txBody>
+          <a:bodyPr wrap="none" rtlCol="0">
+            <a:spAutoFit/>
+          </a:bodyPr>
+          <a:lstStyle/>
+          <a:p>
+            <a:r>
+              <a:rPr lang="en-PH" dirty="0" smtClean="0"/>
+              <a:t>Link to admin </a:t>
+            </a:r>
+            <a:r>
+              <a:rPr lang="en-PH" dirty="0" smtClean="0"/>
+              <a:t>chapter</a:t>
             </a:r>
             <a:endParaRPr lang="en-PH" dirty="0"/>
           </a:p>
@@ -6360,7 +6462,7 @@
         </p:blipFill>
         <p:spPr>
           <a:xfrm>
-            <a:off x="4988506" y="2239760"/>
+            <a:off x="4988506" y="2550459"/>
             <a:ext cx="2135141" cy="1201534"/>
           </a:xfrm>
           <a:prstGeom prst="rect">
@@ -6376,7 +6478,7 @@
         </p:nvSpPr>
         <p:spPr>
           <a:xfrm>
-            <a:off x="4896465" y="1452707"/>
+            <a:off x="4922587" y="1404643"/>
             <a:ext cx="1734770" cy="369332"/>
           </a:xfrm>
           <a:prstGeom prst="rect">
@@ -6406,7 +6508,7 @@
         </p:nvSpPr>
         <p:spPr>
           <a:xfrm>
-            <a:off x="4978674" y="2229927"/>
+            <a:off x="4978674" y="2564231"/>
             <a:ext cx="2135141" cy="1201534"/>
           </a:xfrm>
           <a:prstGeom prst="rect">
@@ -6454,7 +6556,7 @@
         </p:nvSpPr>
         <p:spPr>
           <a:xfrm>
-            <a:off x="4978675" y="3505999"/>
+            <a:off x="5004719" y="3871962"/>
             <a:ext cx="2135140" cy="333350"/>
           </a:xfrm>
           <a:prstGeom prst="roundRect">
@@ -6498,7 +6600,7 @@
         </p:nvSpPr>
         <p:spPr>
           <a:xfrm>
-            <a:off x="5001867" y="1860893"/>
+            <a:off x="4978674" y="2176381"/>
             <a:ext cx="2111948" cy="282539"/>
           </a:xfrm>
           <a:prstGeom prst="roundRect">
@@ -6561,7 +6663,7 @@
         </p:nvCxnSpPr>
         <p:spPr>
           <a:xfrm flipV="1">
-            <a:off x="5065006" y="4345858"/>
+            <a:off x="5056813" y="4591456"/>
             <a:ext cx="2083046" cy="1795"/>
           </a:xfrm>
           <a:prstGeom prst="line">
@@ -6598,7 +6700,7 @@
         </p:nvSpPr>
         <p:spPr>
           <a:xfrm>
-            <a:off x="4978674" y="3936622"/>
+            <a:off x="4921480" y="4223919"/>
             <a:ext cx="910827" cy="369332"/>
           </a:xfrm>
           <a:prstGeom prst="rect">
@@ -6628,7 +6730,7 @@
         </p:nvSpPr>
         <p:spPr>
           <a:xfrm>
-            <a:off x="5001867" y="4344510"/>
+            <a:off x="5001867" y="4569771"/>
             <a:ext cx="1223412" cy="307777"/>
           </a:xfrm>
           <a:prstGeom prst="rect">
@@ -6666,7 +6768,7 @@
         </p:nvCxnSpPr>
         <p:spPr>
           <a:xfrm flipV="1">
-            <a:off x="5040601" y="4684272"/>
+            <a:off x="5013891" y="4859177"/>
             <a:ext cx="2083046" cy="1795"/>
           </a:xfrm>
           <a:prstGeom prst="line">
@@ -6738,7 +6840,7 @@
         </p:nvCxnSpPr>
         <p:spPr>
           <a:xfrm>
-            <a:off x="2956076" y="2002162"/>
+            <a:off x="2956076" y="2227423"/>
             <a:ext cx="2045791" cy="2496237"/>
           </a:xfrm>
           <a:prstGeom prst="straightConnector1">
@@ -6771,7 +6873,7 @@
         </p:nvSpPr>
         <p:spPr>
           <a:xfrm>
-            <a:off x="1152550" y="1687722"/>
+            <a:off x="1603551" y="1842733"/>
             <a:ext cx="1249060" cy="369332"/>
           </a:xfrm>
           <a:prstGeom prst="rect">
@@ -6801,7 +6903,7 @@
         </p:nvCxnSpPr>
         <p:spPr>
           <a:xfrm flipH="1" flipV="1">
-            <a:off x="7196026" y="2808540"/>
+            <a:off x="7139859" y="3151226"/>
             <a:ext cx="2065961" cy="25445"/>
           </a:xfrm>
           <a:prstGeom prst="straightConnector1">
@@ -6834,7 +6936,7 @@
         </p:nvSpPr>
         <p:spPr>
           <a:xfrm>
-            <a:off x="9248631" y="2655861"/>
+            <a:off x="9176349" y="2979282"/>
             <a:ext cx="1597873" cy="369332"/>
           </a:xfrm>
           <a:prstGeom prst="rect">
@@ -6864,7 +6966,7 @@
         </p:nvCxnSpPr>
         <p:spPr>
           <a:xfrm flipH="1" flipV="1">
-            <a:off x="7167189" y="3672674"/>
+            <a:off x="7139859" y="4039826"/>
             <a:ext cx="2065961" cy="25445"/>
           </a:xfrm>
           <a:prstGeom prst="straightConnector1">
@@ -6897,7 +6999,7 @@
         </p:nvSpPr>
         <p:spPr>
           <a:xfrm>
-            <a:off x="9227034" y="3349508"/>
+            <a:off x="9154753" y="3715471"/>
             <a:ext cx="1641066" cy="646331"/>
           </a:xfrm>
           <a:prstGeom prst="rect">
@@ -6927,7 +7029,7 @@
         </p:nvCxnSpPr>
         <p:spPr>
           <a:xfrm flipH="1">
-            <a:off x="6290605" y="4487247"/>
+            <a:off x="6239447" y="4718723"/>
             <a:ext cx="2848948" cy="14982"/>
           </a:xfrm>
           <a:prstGeom prst="straightConnector1">
@@ -6960,7 +7062,7 @@
         </p:nvSpPr>
         <p:spPr>
           <a:xfrm>
-            <a:off x="9204879" y="4171572"/>
+            <a:off x="9102563" y="4394798"/>
             <a:ext cx="1641066" cy="646331"/>
           </a:xfrm>
           <a:prstGeom prst="rect">
@@ -6979,6 +7081,50 @@
               <a:t>Link to actual question</a:t>
             </a:r>
             <a:endParaRPr lang="en-PH" dirty="0"/>
+          </a:p>
+        </p:txBody>
+      </p:sp>
+      <p:sp>
+        <p:nvSpPr>
+          <p:cNvPr id="35" name="Rounded Rectangle 34"/>
+          <p:cNvSpPr/>
+          <p:nvPr/>
+        </p:nvSpPr>
+        <p:spPr>
+          <a:xfrm>
+            <a:off x="4978674" y="1750074"/>
+            <a:ext cx="2135140" cy="333350"/>
+          </a:xfrm>
+          <a:prstGeom prst="roundRect">
+            <a:avLst/>
+          </a:prstGeom>
+        </p:spPr>
+        <p:style>
+          <a:lnRef idx="2">
+            <a:schemeClr val="accent1">
+              <a:shade val="50000"/>
+            </a:schemeClr>
+          </a:lnRef>
+          <a:fillRef idx="1">
+            <a:schemeClr val="accent1"/>
+          </a:fillRef>
+          <a:effectRef idx="0">
+            <a:schemeClr val="accent1"/>
+          </a:effectRef>
+          <a:fontRef idx="minor">
+            <a:schemeClr val="lt1"/>
+          </a:fontRef>
+        </p:style>
+        <p:txBody>
+          <a:bodyPr rtlCol="0" anchor="ctr"/>
+          <a:lstStyle/>
+          <a:p>
+            <a:pPr algn="ctr"/>
+            <a:r>
+              <a:rPr lang="en-PH" sz="1400" dirty="0" smtClean="0"/>
+              <a:t>Dropdown (Chapter)</a:t>
+            </a:r>
+            <a:endParaRPr lang="en-PH" sz="1400" dirty="0"/>
           </a:p>
         </p:txBody>
       </p:sp>
@@ -7278,8 +7424,8 @@
         </p:nvSpPr>
         <p:spPr>
           <a:xfrm>
-            <a:off x="4896465" y="1452707"/>
-            <a:ext cx="1821076" cy="369332"/>
+            <a:off x="4922587" y="1404643"/>
+            <a:ext cx="1889941" cy="369332"/>
           </a:xfrm>
           <a:prstGeom prst="rect">
             <a:avLst/>
@@ -7293,10 +7439,819 @@
           <a:lstStyle/>
           <a:p>
             <a:r>
+              <a:rPr lang="en-PH" dirty="0" smtClean="0"/>
+              <a:t>Adding of </a:t>
+            </a:r>
+            <a:r>
+              <a:rPr lang="en-PH" dirty="0" smtClean="0"/>
+              <a:t>Chapter</a:t>
+            </a:r>
+            <a:endParaRPr lang="en-PH" dirty="0"/>
+          </a:p>
+        </p:txBody>
+      </p:sp>
+      <p:sp>
+        <p:nvSpPr>
+          <p:cNvPr id="13" name="Rounded Rectangle 12"/>
+          <p:cNvSpPr/>
+          <p:nvPr/>
+        </p:nvSpPr>
+        <p:spPr>
+          <a:xfrm>
+            <a:off x="4987844" y="2593396"/>
+            <a:ext cx="2135140" cy="333350"/>
+          </a:xfrm>
+          <a:prstGeom prst="roundRect">
+            <a:avLst/>
+          </a:prstGeom>
+        </p:spPr>
+        <p:style>
+          <a:lnRef idx="2">
+            <a:schemeClr val="accent1">
+              <a:shade val="50000"/>
+            </a:schemeClr>
+          </a:lnRef>
+          <a:fillRef idx="1">
+            <a:schemeClr val="accent1"/>
+          </a:fillRef>
+          <a:effectRef idx="0">
+            <a:schemeClr val="accent1"/>
+          </a:effectRef>
+          <a:fontRef idx="minor">
+            <a:schemeClr val="lt1"/>
+          </a:fontRef>
+        </p:style>
+        <p:txBody>
+          <a:bodyPr rtlCol="0" anchor="ctr"/>
+          <a:lstStyle/>
+          <a:p>
+            <a:pPr algn="ctr"/>
+            <a:r>
+              <a:rPr lang="en-PH" sz="1400" dirty="0" smtClean="0"/>
+              <a:t>Save</a:t>
+            </a:r>
+            <a:endParaRPr lang="en-PH" sz="1400" dirty="0"/>
+          </a:p>
+        </p:txBody>
+      </p:sp>
+      <p:sp>
+        <p:nvSpPr>
+          <p:cNvPr id="14" name="Rounded Rectangle 13"/>
+          <p:cNvSpPr/>
+          <p:nvPr/>
+        </p:nvSpPr>
+        <p:spPr>
+          <a:xfrm>
+            <a:off x="4978674" y="1930574"/>
+            <a:ext cx="2111948" cy="282539"/>
+          </a:xfrm>
+          <a:prstGeom prst="roundRect">
+            <a:avLst/>
+          </a:prstGeom>
+          <a:noFill/>
+          <a:ln>
+            <a:solidFill>
+              <a:schemeClr val="accent1">
+                <a:lumMod val="75000"/>
+              </a:schemeClr>
+            </a:solidFill>
+          </a:ln>
+        </p:spPr>
+        <p:style>
+          <a:lnRef idx="2">
+            <a:schemeClr val="accent1">
+              <a:shade val="50000"/>
+            </a:schemeClr>
+          </a:lnRef>
+          <a:fillRef idx="1">
+            <a:schemeClr val="accent1"/>
+          </a:fillRef>
+          <a:effectRef idx="0">
+            <a:schemeClr val="accent1"/>
+          </a:effectRef>
+          <a:fontRef idx="minor">
+            <a:schemeClr val="lt1"/>
+          </a:fontRef>
+        </p:style>
+        <p:txBody>
+          <a:bodyPr rtlCol="0" anchor="ctr"/>
+          <a:lstStyle/>
+          <a:p>
+            <a:r>
+              <a:rPr lang="en-PH" sz="1400" dirty="0" smtClean="0">
+                <a:solidFill>
+                  <a:schemeClr val="bg1">
+                    <a:lumMod val="75000"/>
+                  </a:schemeClr>
+                </a:solidFill>
+              </a:rPr>
+              <a:t>Lesson title</a:t>
+            </a:r>
+            <a:endParaRPr lang="en-PH" sz="1600" dirty="0">
+              <a:solidFill>
+                <a:schemeClr val="bg1">
+                  <a:lumMod val="75000"/>
+                </a:schemeClr>
+              </a:solidFill>
+            </a:endParaRPr>
+          </a:p>
+        </p:txBody>
+      </p:sp>
+      <p:cxnSp>
+        <p:nvCxnSpPr>
+          <p:cNvPr id="15" name="Straight Connector 14"/>
+          <p:cNvCxnSpPr/>
+          <p:nvPr/>
+        </p:nvCxnSpPr>
+        <p:spPr>
+          <a:xfrm flipV="1">
+            <a:off x="5056813" y="3539399"/>
+            <a:ext cx="2083046" cy="1795"/>
+          </a:xfrm>
+          <a:prstGeom prst="line">
+            <a:avLst/>
+          </a:prstGeom>
+          <a:ln>
+            <a:solidFill>
+              <a:schemeClr val="bg1">
+                <a:lumMod val="75000"/>
+              </a:schemeClr>
+            </a:solidFill>
+          </a:ln>
+        </p:spPr>
+        <p:style>
+          <a:lnRef idx="1">
+            <a:schemeClr val="accent1"/>
+          </a:lnRef>
+          <a:fillRef idx="0">
+            <a:schemeClr val="accent1"/>
+          </a:fillRef>
+          <a:effectRef idx="0">
+            <a:schemeClr val="accent1"/>
+          </a:effectRef>
+          <a:fontRef idx="minor">
+            <a:schemeClr val="tx1"/>
+          </a:fontRef>
+        </p:style>
+      </p:cxnSp>
+      <p:sp>
+        <p:nvSpPr>
+          <p:cNvPr id="16" name="TextBox 15"/>
+          <p:cNvSpPr txBox="1"/>
+          <p:nvPr/>
+        </p:nvSpPr>
+        <p:spPr>
+          <a:xfrm>
+            <a:off x="5008562" y="3163948"/>
+            <a:ext cx="1299074" cy="646331"/>
+          </a:xfrm>
+          <a:prstGeom prst="rect">
+            <a:avLst/>
+          </a:prstGeom>
+          <a:noFill/>
+        </p:spPr>
+        <p:txBody>
+          <a:bodyPr wrap="none" rtlCol="0">
+            <a:spAutoFit/>
+          </a:bodyPr>
+          <a:lstStyle/>
+          <a:p>
+            <a:r>
+              <a:rPr lang="en-PH" dirty="0" smtClean="0"/>
+              <a:t>Chapter List</a:t>
+            </a:r>
+          </a:p>
+          <a:p>
+            <a:endParaRPr lang="en-PH" dirty="0"/>
+          </a:p>
+        </p:txBody>
+      </p:sp>
+      <p:sp>
+        <p:nvSpPr>
+          <p:cNvPr id="20" name="TextBox 19"/>
+          <p:cNvSpPr txBox="1"/>
+          <p:nvPr/>
+        </p:nvSpPr>
+        <p:spPr>
+          <a:xfrm>
+            <a:off x="4922587" y="3576286"/>
+            <a:ext cx="1223412" cy="307777"/>
+          </a:xfrm>
+          <a:prstGeom prst="rect">
+            <a:avLst/>
+          </a:prstGeom>
+          <a:noFill/>
+        </p:spPr>
+        <p:txBody>
+          <a:bodyPr wrap="none" rtlCol="0">
+            <a:spAutoFit/>
+          </a:bodyPr>
+          <a:lstStyle/>
+          <a:p>
+            <a:r>
+              <a:rPr lang="en-PH" sz="1400" dirty="0" smtClean="0">
+                <a:solidFill>
+                  <a:srgbClr val="00B0F0"/>
+                </a:solidFill>
+              </a:rPr>
+              <a:t>Sample lesson</a:t>
+            </a:r>
+            <a:endParaRPr lang="en-PH" sz="1400" dirty="0">
+              <a:solidFill>
+                <a:srgbClr val="00B0F0"/>
+              </a:solidFill>
+            </a:endParaRPr>
+          </a:p>
+        </p:txBody>
+      </p:sp>
+      <p:cxnSp>
+        <p:nvCxnSpPr>
+          <p:cNvPr id="21" name="Straight Connector 20"/>
+          <p:cNvCxnSpPr/>
+          <p:nvPr/>
+        </p:nvCxnSpPr>
+        <p:spPr>
+          <a:xfrm flipV="1">
+            <a:off x="5013891" y="4859177"/>
+            <a:ext cx="2083046" cy="1795"/>
+          </a:xfrm>
+          <a:prstGeom prst="line">
+            <a:avLst/>
+          </a:prstGeom>
+          <a:ln>
+            <a:solidFill>
+              <a:schemeClr val="bg1">
+                <a:lumMod val="75000"/>
+              </a:schemeClr>
+            </a:solidFill>
+          </a:ln>
+        </p:spPr>
+        <p:style>
+          <a:lnRef idx="1">
+            <a:schemeClr val="accent1"/>
+          </a:lnRef>
+          <a:fillRef idx="0">
+            <a:schemeClr val="accent1"/>
+          </a:fillRef>
+          <a:effectRef idx="0">
+            <a:schemeClr val="accent1"/>
+          </a:effectRef>
+          <a:fontRef idx="minor">
+            <a:schemeClr val="tx1"/>
+          </a:fontRef>
+        </p:style>
+      </p:cxnSp>
+      <p:cxnSp>
+        <p:nvCxnSpPr>
+          <p:cNvPr id="22" name="Straight Arrow Connector 21"/>
+          <p:cNvCxnSpPr/>
+          <p:nvPr/>
+        </p:nvCxnSpPr>
+        <p:spPr>
+          <a:xfrm>
+            <a:off x="3022434" y="2022493"/>
+            <a:ext cx="1956240" cy="24256"/>
+          </a:xfrm>
+          <a:prstGeom prst="straightConnector1">
+            <a:avLst/>
+          </a:prstGeom>
+          <a:ln>
+            <a:tailEnd type="triangle"/>
+          </a:ln>
+        </p:spPr>
+        <p:style>
+          <a:lnRef idx="1">
+            <a:schemeClr val="accent1"/>
+          </a:lnRef>
+          <a:fillRef idx="0">
+            <a:schemeClr val="accent1"/>
+          </a:fillRef>
+          <a:effectRef idx="0">
+            <a:schemeClr val="accent1"/>
+          </a:effectRef>
+          <a:fontRef idx="minor">
+            <a:schemeClr val="tx1"/>
+          </a:fontRef>
+        </p:style>
+      </p:cxnSp>
+      <p:cxnSp>
+        <p:nvCxnSpPr>
+          <p:cNvPr id="23" name="Straight Arrow Connector 22"/>
+          <p:cNvCxnSpPr>
+            <a:endCxn id="20" idx="1"/>
+          </p:cNvCxnSpPr>
+          <p:nvPr/>
+        </p:nvCxnSpPr>
+        <p:spPr>
+          <a:xfrm>
+            <a:off x="2852611" y="2331832"/>
+            <a:ext cx="2069976" cy="1398343"/>
+          </a:xfrm>
+          <a:prstGeom prst="straightConnector1">
+            <a:avLst/>
+          </a:prstGeom>
+          <a:ln>
+            <a:tailEnd type="triangle"/>
+          </a:ln>
+        </p:spPr>
+        <p:style>
+          <a:lnRef idx="1">
+            <a:schemeClr val="accent1"/>
+          </a:lnRef>
+          <a:fillRef idx="0">
+            <a:schemeClr val="accent1"/>
+          </a:fillRef>
+          <a:effectRef idx="0">
+            <a:schemeClr val="accent1"/>
+          </a:effectRef>
+          <a:fontRef idx="minor">
+            <a:schemeClr val="tx1"/>
+          </a:fontRef>
+        </p:style>
+      </p:cxnSp>
+      <p:sp>
+        <p:nvSpPr>
+          <p:cNvPr id="25" name="TextBox 24"/>
+          <p:cNvSpPr txBox="1"/>
+          <p:nvPr/>
+        </p:nvSpPr>
+        <p:spPr>
+          <a:xfrm>
+            <a:off x="1603551" y="1842733"/>
+            <a:ext cx="1359346" cy="369332"/>
+          </a:xfrm>
+          <a:prstGeom prst="rect">
+            <a:avLst/>
+          </a:prstGeom>
+          <a:noFill/>
+        </p:spPr>
+        <p:txBody>
+          <a:bodyPr wrap="none" rtlCol="0">
+            <a:spAutoFit/>
+          </a:bodyPr>
+          <a:lstStyle/>
+          <a:p>
+            <a:r>
+              <a:rPr lang="en-PH" dirty="0" smtClean="0"/>
+              <a:t>Chapter </a:t>
+            </a:r>
+            <a:r>
+              <a:rPr lang="en-PH" dirty="0" smtClean="0"/>
+              <a:t>title</a:t>
+            </a:r>
+            <a:endParaRPr lang="en-PH" dirty="0"/>
+          </a:p>
+        </p:txBody>
+      </p:sp>
+      <p:cxnSp>
+        <p:nvCxnSpPr>
+          <p:cNvPr id="31" name="Straight Arrow Connector 30"/>
+          <p:cNvCxnSpPr>
+            <a:stCxn id="32" idx="1"/>
+          </p:cNvCxnSpPr>
+          <p:nvPr/>
+        </p:nvCxnSpPr>
+        <p:spPr>
+          <a:xfrm flipH="1" flipV="1">
+            <a:off x="7196027" y="3052532"/>
+            <a:ext cx="2106624" cy="30705"/>
+          </a:xfrm>
+          <a:prstGeom prst="straightConnector1">
+            <a:avLst/>
+          </a:prstGeom>
+          <a:ln>
+            <a:tailEnd type="triangle"/>
+          </a:ln>
+        </p:spPr>
+        <p:style>
+          <a:lnRef idx="1">
+            <a:schemeClr val="accent1"/>
+          </a:lnRef>
+          <a:fillRef idx="0">
+            <a:schemeClr val="accent1"/>
+          </a:fillRef>
+          <a:effectRef idx="0">
+            <a:schemeClr val="accent1"/>
+          </a:effectRef>
+          <a:fontRef idx="minor">
+            <a:schemeClr val="tx1"/>
+          </a:fontRef>
+        </p:style>
+      </p:cxnSp>
+      <p:sp>
+        <p:nvSpPr>
+          <p:cNvPr id="32" name="TextBox 31"/>
+          <p:cNvSpPr txBox="1"/>
+          <p:nvPr/>
+        </p:nvSpPr>
+        <p:spPr>
+          <a:xfrm>
+            <a:off x="9302651" y="2760071"/>
+            <a:ext cx="2181426" cy="646331"/>
+          </a:xfrm>
+          <a:prstGeom prst="rect">
+            <a:avLst/>
+          </a:prstGeom>
+          <a:noFill/>
+        </p:spPr>
+        <p:txBody>
+          <a:bodyPr wrap="square" rtlCol="0">
+            <a:spAutoFit/>
+          </a:bodyPr>
+          <a:lstStyle/>
+          <a:p>
+            <a:r>
+              <a:rPr lang="en-PH" dirty="0" smtClean="0"/>
+              <a:t>Button to save </a:t>
+            </a:r>
+            <a:r>
+              <a:rPr lang="en-PH" dirty="0" smtClean="0"/>
+              <a:t>created chapter</a:t>
+            </a:r>
+            <a:endParaRPr lang="en-PH" dirty="0"/>
+          </a:p>
+        </p:txBody>
+      </p:sp>
+      <p:cxnSp>
+        <p:nvCxnSpPr>
+          <p:cNvPr id="33" name="Straight Arrow Connector 32"/>
+          <p:cNvCxnSpPr/>
+          <p:nvPr/>
+        </p:nvCxnSpPr>
+        <p:spPr>
+          <a:xfrm flipH="1" flipV="1">
+            <a:off x="6307636" y="3884063"/>
+            <a:ext cx="2780759" cy="834660"/>
+          </a:xfrm>
+          <a:prstGeom prst="straightConnector1">
+            <a:avLst/>
+          </a:prstGeom>
+          <a:ln>
+            <a:tailEnd type="triangle"/>
+          </a:ln>
+        </p:spPr>
+        <p:style>
+          <a:lnRef idx="1">
+            <a:schemeClr val="accent1"/>
+          </a:lnRef>
+          <a:fillRef idx="0">
+            <a:schemeClr val="accent1"/>
+          </a:fillRef>
+          <a:effectRef idx="0">
+            <a:schemeClr val="accent1"/>
+          </a:effectRef>
+          <a:fontRef idx="minor">
+            <a:schemeClr val="tx1"/>
+          </a:fontRef>
+        </p:style>
+      </p:cxnSp>
+      <p:sp>
+        <p:nvSpPr>
+          <p:cNvPr id="34" name="TextBox 33"/>
+          <p:cNvSpPr txBox="1"/>
+          <p:nvPr/>
+        </p:nvSpPr>
+        <p:spPr>
+          <a:xfrm>
+            <a:off x="9102562" y="4394798"/>
+            <a:ext cx="2184869" cy="646331"/>
+          </a:xfrm>
+          <a:prstGeom prst="rect">
+            <a:avLst/>
+          </a:prstGeom>
+          <a:noFill/>
+        </p:spPr>
+        <p:txBody>
+          <a:bodyPr wrap="square" rtlCol="0">
+            <a:spAutoFit/>
+          </a:bodyPr>
+          <a:lstStyle/>
+          <a:p>
+            <a:r>
+              <a:rPr lang="en-PH" dirty="0" smtClean="0"/>
+              <a:t>Link to actual </a:t>
+            </a:r>
+            <a:r>
+              <a:rPr lang="en-PH" dirty="0" smtClean="0"/>
+              <a:t>Chapter</a:t>
+            </a:r>
+          </a:p>
+        </p:txBody>
+      </p:sp>
+    </p:spTree>
+    <p:extLst>
+      <p:ext uri="{BB962C8B-B14F-4D97-AF65-F5344CB8AC3E}">
+        <p14:creationId xmlns:p14="http://schemas.microsoft.com/office/powerpoint/2010/main" val="3518620406"/>
+      </p:ext>
+    </p:extLst>
+  </p:cSld>
+  <p:clrMapOvr>
+    <a:masterClrMapping/>
+  </p:clrMapOvr>
+</p:sld>
+</file>
+
+<file path=ppt/slides/slide6.xml><?xml version="1.0" encoding="utf-8"?>
+<p:sld xmlns:a="http://schemas.openxmlformats.org/drawingml/2006/main" xmlns:r="http://schemas.openxmlformats.org/officeDocument/2006/relationships" xmlns:p="http://schemas.openxmlformats.org/presentationml/2006/main">
+  <p:cSld>
+    <p:spTree>
+      <p:nvGrpSpPr>
+        <p:cNvPr id="1" name=""/>
+        <p:cNvGrpSpPr/>
+        <p:nvPr/>
+      </p:nvGrpSpPr>
+      <p:grpSpPr>
+        <a:xfrm>
+          <a:off x="0" y="0"/>
+          <a:ext cx="0" cy="0"/>
+          <a:chOff x="0" y="0"/>
+          <a:chExt cx="0" cy="0"/>
+        </a:xfrm>
+      </p:grpSpPr>
+      <p:pic>
+        <p:nvPicPr>
+          <p:cNvPr id="7" name="Picture 6"/>
+          <p:cNvPicPr>
+            <a:picLocks noChangeAspect="1"/>
+          </p:cNvPicPr>
+          <p:nvPr/>
+        </p:nvPicPr>
+        <p:blipFill>
+          <a:blip r:embed="rId2">
+            <a:extLst>
+              <a:ext uri="{28A0092B-C50C-407E-A947-70E740481C1C}">
+                <a14:useLocalDpi xmlns:a14="http://schemas.microsoft.com/office/drawing/2010/main" val="0"/>
+              </a:ext>
+            </a:extLst>
+          </a:blip>
+          <a:stretch>
+            <a:fillRect/>
+          </a:stretch>
+        </p:blipFill>
+        <p:spPr>
+          <a:xfrm>
+            <a:off x="3182670" y="417323"/>
+            <a:ext cx="5745489" cy="5745489"/>
+          </a:xfrm>
+          <a:prstGeom prst="rect">
+            <a:avLst/>
+          </a:prstGeom>
+        </p:spPr>
+      </p:pic>
+      <p:pic>
+        <p:nvPicPr>
+          <p:cNvPr id="18" name="Picture 17"/>
+          <p:cNvPicPr>
+            <a:picLocks noChangeAspect="1"/>
+          </p:cNvPicPr>
+          <p:nvPr/>
+        </p:nvPicPr>
+        <p:blipFill>
+          <a:blip r:embed="rId3" cstate="print">
+            <a:extLst>
+              <a:ext uri="{28A0092B-C50C-407E-A947-70E740481C1C}">
+                <a14:useLocalDpi xmlns:a14="http://schemas.microsoft.com/office/drawing/2010/main" val="0"/>
+              </a:ext>
+            </a:extLst>
+          </a:blip>
+          <a:stretch>
+            <a:fillRect/>
+          </a:stretch>
+        </p:blipFill>
+        <p:spPr>
+          <a:xfrm>
+            <a:off x="6656000" y="834551"/>
+            <a:ext cx="540026" cy="540026"/>
+          </a:xfrm>
+          <a:prstGeom prst="rect">
+            <a:avLst/>
+          </a:prstGeom>
+        </p:spPr>
+      </p:pic>
+      <p:cxnSp>
+        <p:nvCxnSpPr>
+          <p:cNvPr id="26" name="Straight Arrow Connector 25"/>
+          <p:cNvCxnSpPr>
+            <a:endCxn id="18" idx="3"/>
+          </p:cNvCxnSpPr>
+          <p:nvPr/>
+        </p:nvCxnSpPr>
+        <p:spPr>
+          <a:xfrm flipH="1" flipV="1">
+            <a:off x="7196026" y="1104564"/>
+            <a:ext cx="2272160" cy="143163"/>
+          </a:xfrm>
+          <a:prstGeom prst="straightConnector1">
+            <a:avLst/>
+          </a:prstGeom>
+          <a:ln>
+            <a:tailEnd type="triangle"/>
+          </a:ln>
+        </p:spPr>
+        <p:style>
+          <a:lnRef idx="1">
+            <a:schemeClr val="accent1"/>
+          </a:lnRef>
+          <a:fillRef idx="0">
+            <a:schemeClr val="accent1"/>
+          </a:fillRef>
+          <a:effectRef idx="0">
+            <a:schemeClr val="accent1"/>
+          </a:effectRef>
+          <a:fontRef idx="minor">
+            <a:schemeClr val="tx1"/>
+          </a:fontRef>
+        </p:style>
+      </p:cxnSp>
+      <p:sp>
+        <p:nvSpPr>
+          <p:cNvPr id="27" name="TextBox 26"/>
+          <p:cNvSpPr txBox="1"/>
+          <p:nvPr/>
+        </p:nvSpPr>
+        <p:spPr>
+          <a:xfrm>
+            <a:off x="9468185" y="1063061"/>
+            <a:ext cx="1475532" cy="369332"/>
+          </a:xfrm>
+          <a:prstGeom prst="rect">
+            <a:avLst/>
+          </a:prstGeom>
+          <a:noFill/>
+        </p:spPr>
+        <p:txBody>
+          <a:bodyPr wrap="none" rtlCol="0">
+            <a:spAutoFit/>
+          </a:bodyPr>
+          <a:lstStyle/>
+          <a:p>
+            <a:r>
+              <a:rPr lang="en-PH" dirty="0" smtClean="0"/>
+              <a:t>Link to profile</a:t>
+            </a:r>
+            <a:endParaRPr lang="en-PH" dirty="0"/>
+          </a:p>
+        </p:txBody>
+      </p:sp>
+      <p:cxnSp>
+        <p:nvCxnSpPr>
+          <p:cNvPr id="6" name="Straight Connector 5"/>
+          <p:cNvCxnSpPr/>
+          <p:nvPr/>
+        </p:nvCxnSpPr>
+        <p:spPr>
+          <a:xfrm>
+            <a:off x="4896465" y="1374577"/>
+            <a:ext cx="2299561" cy="0"/>
+          </a:xfrm>
+          <a:prstGeom prst="line">
+            <a:avLst/>
+          </a:prstGeom>
+          <a:ln>
+            <a:solidFill>
+              <a:schemeClr val="bg1">
+                <a:lumMod val="85000"/>
+              </a:schemeClr>
+            </a:solidFill>
+          </a:ln>
+        </p:spPr>
+        <p:style>
+          <a:lnRef idx="1">
+            <a:schemeClr val="accent1"/>
+          </a:lnRef>
+          <a:fillRef idx="0">
+            <a:schemeClr val="accent1"/>
+          </a:fillRef>
+          <a:effectRef idx="0">
+            <a:schemeClr val="accent1"/>
+          </a:effectRef>
+          <a:fontRef idx="minor">
+            <a:schemeClr val="tx1"/>
+          </a:fontRef>
+        </p:style>
+      </p:cxnSp>
+      <p:pic>
+        <p:nvPicPr>
+          <p:cNvPr id="9" name="Picture 8"/>
+          <p:cNvPicPr>
+            <a:picLocks noChangeAspect="1"/>
+          </p:cNvPicPr>
+          <p:nvPr/>
+        </p:nvPicPr>
+        <p:blipFill>
+          <a:blip r:embed="rId4" cstate="print">
+            <a:extLst>
+              <a:ext uri="{28A0092B-C50C-407E-A947-70E740481C1C}">
+                <a14:useLocalDpi xmlns:a14="http://schemas.microsoft.com/office/drawing/2010/main" val="0"/>
+              </a:ext>
+            </a:extLst>
+          </a:blip>
+          <a:stretch>
+            <a:fillRect/>
+          </a:stretch>
+        </p:blipFill>
+        <p:spPr>
+          <a:xfrm>
+            <a:off x="4984042" y="908138"/>
+            <a:ext cx="392852" cy="392852"/>
+          </a:xfrm>
+          <a:prstGeom prst="rect">
+            <a:avLst/>
+          </a:prstGeom>
+        </p:spPr>
+      </p:pic>
+      <p:cxnSp>
+        <p:nvCxnSpPr>
+          <p:cNvPr id="11" name="Straight Arrow Connector 10"/>
+          <p:cNvCxnSpPr>
+            <a:stCxn id="28" idx="3"/>
+            <a:endCxn id="9" idx="1"/>
+          </p:cNvCxnSpPr>
+          <p:nvPr/>
+        </p:nvCxnSpPr>
+        <p:spPr>
+          <a:xfrm>
+            <a:off x="2971276" y="958036"/>
+            <a:ext cx="2012766" cy="146528"/>
+          </a:xfrm>
+          <a:prstGeom prst="straightConnector1">
+            <a:avLst/>
+          </a:prstGeom>
+          <a:ln>
+            <a:tailEnd type="triangle"/>
+          </a:ln>
+        </p:spPr>
+        <p:style>
+          <a:lnRef idx="1">
+            <a:schemeClr val="accent1"/>
+          </a:lnRef>
+          <a:fillRef idx="0">
+            <a:schemeClr val="accent1"/>
+          </a:fillRef>
+          <a:effectRef idx="0">
+            <a:schemeClr val="accent1"/>
+          </a:effectRef>
+          <a:fontRef idx="minor">
+            <a:schemeClr val="tx1"/>
+          </a:fontRef>
+        </p:style>
+      </p:cxnSp>
+      <p:sp>
+        <p:nvSpPr>
+          <p:cNvPr id="28" name="TextBox 27"/>
+          <p:cNvSpPr txBox="1"/>
+          <p:nvPr/>
+        </p:nvSpPr>
+        <p:spPr>
+          <a:xfrm>
+            <a:off x="1139492" y="773370"/>
+            <a:ext cx="1831784" cy="369332"/>
+          </a:xfrm>
+          <a:prstGeom prst="rect">
+            <a:avLst/>
+          </a:prstGeom>
+          <a:noFill/>
+        </p:spPr>
+        <p:txBody>
+          <a:bodyPr wrap="none" rtlCol="0">
+            <a:spAutoFit/>
+          </a:bodyPr>
+          <a:lstStyle/>
+          <a:p>
+            <a:r>
+              <a:rPr lang="en-PH" dirty="0" smtClean="0"/>
+              <a:t>Toggle side menu</a:t>
+            </a:r>
+            <a:endParaRPr lang="en-PH" dirty="0"/>
+          </a:p>
+        </p:txBody>
+      </p:sp>
+      <p:sp>
+        <p:nvSpPr>
+          <p:cNvPr id="19" name="TextBox 18"/>
+          <p:cNvSpPr txBox="1"/>
+          <p:nvPr/>
+        </p:nvSpPr>
+        <p:spPr>
+          <a:xfrm>
+            <a:off x="4896465" y="1452707"/>
+            <a:ext cx="1821076" cy="369332"/>
+          </a:xfrm>
+          <a:prstGeom prst="rect">
+            <a:avLst/>
+          </a:prstGeom>
+          <a:noFill/>
+        </p:spPr>
+        <p:txBody>
+          <a:bodyPr wrap="none" rtlCol="0">
+            <a:spAutoFit/>
+          </a:bodyPr>
+          <a:lstStyle/>
+          <a:p>
+            <a:r>
               <a:rPr lang="en-PH" dirty="0"/>
               <a:t>Adding (test title)</a:t>
             </a:r>
-            <a:endParaRPr lang="en-PH" dirty="0"/>
           </a:p>
         </p:txBody>
       </p:sp>

</xml_diff>

<commit_message>
Working on the question route. and updated the schema of the question_range (needs to update the question_range route queries).
</commit_message>
<xml_diff>
--- a/materials/documentation/eDyscalculia App Wireframe - Admin.pptx
+++ b/materials/documentation/eDyscalculia App Wireframe - Admin.pptx
@@ -236,7 +236,7 @@
           <a:p>
             <a:fld id="{101881B7-76EF-4B04-9C34-D3583E3944EF}" type="datetimeFigureOut">
               <a:rPr lang="en-PH" smtClean="0"/>
-              <a:t>1/15/2018</a:t>
+              <a:t>1/25/2018</a:t>
             </a:fld>
             <a:endParaRPr lang="en-PH"/>
           </a:p>
@@ -635,7 +635,7 @@
           <a:p>
             <a:fld id="{D1C7A99B-1870-45E6-A2F7-F806AAA7BFA2}" type="datetimeFigureOut">
               <a:rPr lang="en-PH" smtClean="0"/>
-              <a:t>1/15/2018</a:t>
+              <a:t>1/25/2018</a:t>
             </a:fld>
             <a:endParaRPr lang="en-PH"/>
           </a:p>
@@ -805,7 +805,7 @@
           <a:p>
             <a:fld id="{D1C7A99B-1870-45E6-A2F7-F806AAA7BFA2}" type="datetimeFigureOut">
               <a:rPr lang="en-PH" smtClean="0"/>
-              <a:t>1/15/2018</a:t>
+              <a:t>1/25/2018</a:t>
             </a:fld>
             <a:endParaRPr lang="en-PH"/>
           </a:p>
@@ -985,7 +985,7 @@
           <a:p>
             <a:fld id="{D1C7A99B-1870-45E6-A2F7-F806AAA7BFA2}" type="datetimeFigureOut">
               <a:rPr lang="en-PH" smtClean="0"/>
-              <a:t>1/15/2018</a:t>
+              <a:t>1/25/2018</a:t>
             </a:fld>
             <a:endParaRPr lang="en-PH"/>
           </a:p>
@@ -1155,7 +1155,7 @@
           <a:p>
             <a:fld id="{D1C7A99B-1870-45E6-A2F7-F806AAA7BFA2}" type="datetimeFigureOut">
               <a:rPr lang="en-PH" smtClean="0"/>
-              <a:t>1/15/2018</a:t>
+              <a:t>1/25/2018</a:t>
             </a:fld>
             <a:endParaRPr lang="en-PH"/>
           </a:p>
@@ -1401,7 +1401,7 @@
           <a:p>
             <a:fld id="{D1C7A99B-1870-45E6-A2F7-F806AAA7BFA2}" type="datetimeFigureOut">
               <a:rPr lang="en-PH" smtClean="0"/>
-              <a:t>1/15/2018</a:t>
+              <a:t>1/25/2018</a:t>
             </a:fld>
             <a:endParaRPr lang="en-PH"/>
           </a:p>
@@ -1633,7 +1633,7 @@
           <a:p>
             <a:fld id="{D1C7A99B-1870-45E6-A2F7-F806AAA7BFA2}" type="datetimeFigureOut">
               <a:rPr lang="en-PH" smtClean="0"/>
-              <a:t>1/15/2018</a:t>
+              <a:t>1/25/2018</a:t>
             </a:fld>
             <a:endParaRPr lang="en-PH"/>
           </a:p>
@@ -2000,7 +2000,7 @@
           <a:p>
             <a:fld id="{D1C7A99B-1870-45E6-A2F7-F806AAA7BFA2}" type="datetimeFigureOut">
               <a:rPr lang="en-PH" smtClean="0"/>
-              <a:t>1/15/2018</a:t>
+              <a:t>1/25/2018</a:t>
             </a:fld>
             <a:endParaRPr lang="en-PH"/>
           </a:p>
@@ -2118,7 +2118,7 @@
           <a:p>
             <a:fld id="{D1C7A99B-1870-45E6-A2F7-F806AAA7BFA2}" type="datetimeFigureOut">
               <a:rPr lang="en-PH" smtClean="0"/>
-              <a:t>1/15/2018</a:t>
+              <a:t>1/25/2018</a:t>
             </a:fld>
             <a:endParaRPr lang="en-PH"/>
           </a:p>
@@ -2213,7 +2213,7 @@
           <a:p>
             <a:fld id="{D1C7A99B-1870-45E6-A2F7-F806AAA7BFA2}" type="datetimeFigureOut">
               <a:rPr lang="en-PH" smtClean="0"/>
-              <a:t>1/15/2018</a:t>
+              <a:t>1/25/2018</a:t>
             </a:fld>
             <a:endParaRPr lang="en-PH"/>
           </a:p>
@@ -2490,7 +2490,7 @@
           <a:p>
             <a:fld id="{D1C7A99B-1870-45E6-A2F7-F806AAA7BFA2}" type="datetimeFigureOut">
               <a:rPr lang="en-PH" smtClean="0"/>
-              <a:t>1/15/2018</a:t>
+              <a:t>1/25/2018</a:t>
             </a:fld>
             <a:endParaRPr lang="en-PH"/>
           </a:p>
@@ -2743,7 +2743,7 @@
           <a:p>
             <a:fld id="{D1C7A99B-1870-45E6-A2F7-F806AAA7BFA2}" type="datetimeFigureOut">
               <a:rPr lang="en-PH" smtClean="0"/>
-              <a:t>1/15/2018</a:t>
+              <a:t>1/25/2018</a:t>
             </a:fld>
             <a:endParaRPr lang="en-PH"/>
           </a:p>
@@ -2956,7 +2956,7 @@
           <a:p>
             <a:fld id="{D1C7A99B-1870-45E6-A2F7-F806AAA7BFA2}" type="datetimeFigureOut">
               <a:rPr lang="en-PH" smtClean="0"/>
-              <a:t>1/15/2018</a:t>
+              <a:t>1/25/2018</a:t>
             </a:fld>
             <a:endParaRPr lang="en-PH"/>
           </a:p>
@@ -5472,11 +5472,7 @@
           <a:p>
             <a:r>
               <a:rPr lang="en-PH" dirty="0" smtClean="0"/>
-              <a:t>Link to admin </a:t>
-            </a:r>
-            <a:r>
-              <a:rPr lang="en-PH" dirty="0" smtClean="0"/>
-              <a:t>chapter</a:t>
+              <a:t>Link to admin chapter</a:t>
             </a:r>
             <a:endParaRPr lang="en-PH" dirty="0"/>
           </a:p>
@@ -7440,11 +7436,7 @@
           <a:p>
             <a:r>
               <a:rPr lang="en-PH" dirty="0" smtClean="0"/>
-              <a:t>Adding of </a:t>
-            </a:r>
-            <a:r>
-              <a:rPr lang="en-PH" dirty="0" smtClean="0"/>
-              <a:t>Chapter</a:t>
+              <a:t>Adding of Chapter</a:t>
             </a:r>
             <a:endParaRPr lang="en-PH" dirty="0"/>
           </a:p>
@@ -7793,11 +7785,7 @@
           <a:p>
             <a:r>
               <a:rPr lang="en-PH" dirty="0" smtClean="0"/>
-              <a:t>Chapter </a:t>
-            </a:r>
-            <a:r>
-              <a:rPr lang="en-PH" dirty="0" smtClean="0"/>
-              <a:t>title</a:t>
+              <a:t>Chapter title</a:t>
             </a:r>
             <a:endParaRPr lang="en-PH" dirty="0"/>
           </a:p>
@@ -7862,11 +7850,7 @@
           <a:p>
             <a:r>
               <a:rPr lang="en-PH" dirty="0" smtClean="0"/>
-              <a:t>Button to save </a:t>
-            </a:r>
-            <a:r>
-              <a:rPr lang="en-PH" dirty="0" smtClean="0"/>
-              <a:t>created chapter</a:t>
+              <a:t>Button to save created chapter</a:t>
             </a:r>
             <a:endParaRPr lang="en-PH" dirty="0"/>
           </a:p>
@@ -7929,11 +7913,7 @@
           <a:p>
             <a:r>
               <a:rPr lang="en-PH" dirty="0" smtClean="0"/>
-              <a:t>Link to actual </a:t>
-            </a:r>
-            <a:r>
-              <a:rPr lang="en-PH" dirty="0" smtClean="0"/>
-              <a:t>Chapter</a:t>
+              <a:t>Link to actual Chapter</a:t>
             </a:r>
           </a:p>
         </p:txBody>
@@ -7990,8 +7970,8 @@
         </p:blipFill>
         <p:spPr>
           <a:xfrm>
-            <a:off x="3182670" y="417323"/>
-            <a:ext cx="5745489" cy="5745489"/>
+            <a:off x="3185096" y="377535"/>
+            <a:ext cx="5745489" cy="6701691"/>
           </a:xfrm>
           <a:prstGeom prst="rect">
             <a:avLst/>
@@ -8234,7 +8214,7 @@
         </p:nvSpPr>
         <p:spPr>
           <a:xfrm>
-            <a:off x="4896465" y="1452707"/>
+            <a:off x="4861680" y="1175683"/>
             <a:ext cx="1821076" cy="369332"/>
           </a:xfrm>
           <a:prstGeom prst="rect">
@@ -8263,7 +8243,7 @@
         </p:nvSpPr>
         <p:spPr>
           <a:xfrm>
-            <a:off x="4978675" y="3715549"/>
+            <a:off x="4988267" y="4561353"/>
             <a:ext cx="2135140" cy="333350"/>
           </a:xfrm>
           <a:prstGeom prst="roundRect">
@@ -8307,7 +8287,7 @@
         </p:nvSpPr>
         <p:spPr>
           <a:xfrm>
-            <a:off x="5001867" y="1860893"/>
+            <a:off x="4984042" y="2844147"/>
             <a:ext cx="2111948" cy="297765"/>
           </a:xfrm>
           <a:prstGeom prst="roundRect">
@@ -8370,7 +8350,7 @@
         </p:nvCxnSpPr>
         <p:spPr>
           <a:xfrm flipV="1">
-            <a:off x="5065006" y="4403008"/>
+            <a:off x="5050757" y="5188516"/>
             <a:ext cx="2083046" cy="1795"/>
           </a:xfrm>
           <a:prstGeom prst="line">
@@ -8407,8 +8387,8 @@
         </p:nvSpPr>
         <p:spPr>
           <a:xfrm>
-            <a:off x="4978674" y="4060447"/>
-            <a:ext cx="1027204" cy="369332"/>
+            <a:off x="4964425" y="4845955"/>
+            <a:ext cx="1518364" cy="369332"/>
           </a:xfrm>
           <a:prstGeom prst="rect">
             <a:avLst/>
@@ -8423,7 +8403,11 @@
           <a:p>
             <a:r>
               <a:rPr lang="en-PH" dirty="0" smtClean="0"/>
-              <a:t>Test type</a:t>
+              <a:t>Test </a:t>
+            </a:r>
+            <a:r>
+              <a:rPr lang="en-PH" dirty="0" smtClean="0"/>
+              <a:t>questions</a:t>
             </a:r>
             <a:endParaRPr lang="en-PH" dirty="0"/>
           </a:p>
@@ -8437,7 +8421,7 @@
         </p:nvSpPr>
         <p:spPr>
           <a:xfrm>
-            <a:off x="5001867" y="4401660"/>
+            <a:off x="4984413" y="5223510"/>
             <a:ext cx="1400961" cy="307777"/>
           </a:xfrm>
           <a:prstGeom prst="rect">
@@ -8475,7 +8459,7 @@
         </p:nvCxnSpPr>
         <p:spPr>
           <a:xfrm flipV="1">
-            <a:off x="5040601" y="4741422"/>
+            <a:off x="5001867" y="5591270"/>
             <a:ext cx="2083046" cy="1795"/>
           </a:xfrm>
           <a:prstGeom prst="line">
@@ -8512,8 +8496,8 @@
         </p:nvCxnSpPr>
         <p:spPr>
           <a:xfrm>
-            <a:off x="2965908" y="1860893"/>
-            <a:ext cx="2012766" cy="199039"/>
+            <a:off x="2874965" y="2146028"/>
+            <a:ext cx="1986715" cy="847001"/>
           </a:xfrm>
           <a:prstGeom prst="straightConnector1">
             <a:avLst/>
@@ -8547,8 +8531,8 @@
         </p:nvCxnSpPr>
         <p:spPr>
           <a:xfrm>
-            <a:off x="2956076" y="2002162"/>
-            <a:ext cx="2045791" cy="2496237"/>
+            <a:off x="2041010" y="2084413"/>
+            <a:ext cx="2943403" cy="3292986"/>
           </a:xfrm>
           <a:prstGeom prst="straightConnector1">
             <a:avLst/>
@@ -8581,7 +8565,7 @@
         <p:spPr>
           <a:xfrm>
             <a:off x="1514119" y="1676227"/>
-            <a:ext cx="1428596" cy="369332"/>
+            <a:ext cx="2813847" cy="369332"/>
           </a:xfrm>
           <a:prstGeom prst="rect">
             <a:avLst/>
@@ -8596,7 +8580,19 @@
           <a:p>
             <a:r>
               <a:rPr lang="en-PH" dirty="0" smtClean="0"/>
-              <a:t>Test question</a:t>
+              <a:t>Test </a:t>
+            </a:r>
+            <a:r>
+              <a:rPr lang="en-PH" dirty="0" smtClean="0"/>
+              <a:t>question (</a:t>
+            </a:r>
+            <a:r>
+              <a:rPr lang="en-PH" dirty="0" err="1" smtClean="0"/>
+              <a:t>Froala</a:t>
+            </a:r>
+            <a:r>
+              <a:rPr lang="en-PH" dirty="0" smtClean="0"/>
+              <a:t> Editor)</a:t>
             </a:r>
             <a:endParaRPr lang="en-PH" dirty="0"/>
           </a:p>
@@ -8610,7 +8606,7 @@
         </p:nvSpPr>
         <p:spPr>
           <a:xfrm>
-            <a:off x="5001867" y="2239962"/>
+            <a:off x="5002446" y="3242592"/>
             <a:ext cx="1654133" cy="345169"/>
           </a:xfrm>
           <a:prstGeom prst="roundRect">
@@ -8687,8 +8683,8 @@
         </p:blipFill>
         <p:spPr>
           <a:xfrm>
-            <a:off x="6763769" y="2264174"/>
-            <a:ext cx="302583" cy="302583"/>
+            <a:off x="6744685" y="3296723"/>
+            <a:ext cx="292328" cy="292328"/>
           </a:xfrm>
           <a:prstGeom prst="rect">
             <a:avLst/>
@@ -8703,7 +8699,7 @@
         </p:nvSpPr>
         <p:spPr>
           <a:xfrm>
-            <a:off x="5001867" y="2653762"/>
+            <a:off x="4998663" y="3654269"/>
             <a:ext cx="1654133" cy="267988"/>
           </a:xfrm>
           <a:prstGeom prst="roundRect">
@@ -8760,8 +8756,8 @@
         </p:blipFill>
         <p:spPr>
           <a:xfrm>
-            <a:off x="6753994" y="2634173"/>
-            <a:ext cx="312357" cy="312357"/>
+            <a:off x="6750791" y="3654405"/>
+            <a:ext cx="253304" cy="253304"/>
           </a:xfrm>
           <a:prstGeom prst="rect">
             <a:avLst/>
@@ -8776,7 +8772,7 @@
         </p:nvSpPr>
         <p:spPr>
           <a:xfrm>
-            <a:off x="5005704" y="2999926"/>
+            <a:off x="5002500" y="3951273"/>
             <a:ext cx="1640772" cy="280536"/>
           </a:xfrm>
           <a:prstGeom prst="roundRect">
@@ -8833,8 +8829,8 @@
         </p:blipFill>
         <p:spPr>
           <a:xfrm>
-            <a:off x="6763769" y="2999926"/>
-            <a:ext cx="312357" cy="312357"/>
+            <a:off x="6760565" y="3970941"/>
+            <a:ext cx="243529" cy="243529"/>
           </a:xfrm>
           <a:prstGeom prst="rect">
             <a:avLst/>
@@ -8849,7 +8845,7 @@
         </p:nvSpPr>
         <p:spPr>
           <a:xfrm>
-            <a:off x="5005704" y="3352351"/>
+            <a:off x="5002500" y="4254538"/>
             <a:ext cx="1640772" cy="280536"/>
           </a:xfrm>
           <a:prstGeom prst="roundRect">
@@ -8906,7 +8902,7 @@
         </p:blipFill>
         <p:spPr>
           <a:xfrm>
-            <a:off x="6793035" y="3362567"/>
+            <a:off x="6789831" y="4264754"/>
             <a:ext cx="273566" cy="273566"/>
           </a:xfrm>
           <a:prstGeom prst="rect">
@@ -8922,11 +8918,14 @@
         </p:nvSpPr>
         <p:spPr>
           <a:xfrm>
-            <a:off x="7059880" y="2676509"/>
-            <a:ext cx="1338723" cy="907642"/>
+            <a:off x="7056676" y="3416095"/>
+            <a:ext cx="1338723" cy="912927"/>
           </a:xfrm>
           <a:prstGeom prst="rightBrace">
-            <a:avLst/>
+            <a:avLst>
+              <a:gd name="adj1" fmla="val 8333"/>
+              <a:gd name="adj2" fmla="val 44584"/>
+            </a:avLst>
           </a:prstGeom>
         </p:spPr>
         <p:style>
@@ -8960,7 +8959,7 @@
         </p:nvSpPr>
         <p:spPr>
           <a:xfrm>
-            <a:off x="8431905" y="2817028"/>
+            <a:off x="8375871" y="3456751"/>
             <a:ext cx="2314986" cy="646331"/>
           </a:xfrm>
           <a:prstGeom prst="rect">
@@ -8996,8 +8995,8 @@
         </p:nvCxnSpPr>
         <p:spPr>
           <a:xfrm flipH="1">
-            <a:off x="7066351" y="2059932"/>
-            <a:ext cx="2401833" cy="730420"/>
+            <a:off x="7004095" y="2408094"/>
+            <a:ext cx="2339894" cy="1372963"/>
           </a:xfrm>
           <a:prstGeom prst="straightConnector1">
             <a:avLst/>
@@ -9054,13 +9053,15 @@
       <p:cxnSp>
         <p:nvCxnSpPr>
           <p:cNvPr id="49" name="Straight Arrow Connector 48"/>
-          <p:cNvCxnSpPr/>
+          <p:cNvCxnSpPr>
+            <a:stCxn id="50" idx="1"/>
+          </p:cNvCxnSpPr>
           <p:nvPr/>
         </p:nvCxnSpPr>
         <p:spPr>
-          <a:xfrm flipH="1" flipV="1">
-            <a:off x="7167189" y="3882224"/>
-            <a:ext cx="2065961" cy="25445"/>
+          <a:xfrm flipH="1">
+            <a:off x="7187178" y="4567387"/>
+            <a:ext cx="2459951" cy="91481"/>
           </a:xfrm>
           <a:prstGeom prst="straightConnector1">
             <a:avLst/>
@@ -9092,7 +9093,7 @@
         </p:nvSpPr>
         <p:spPr>
           <a:xfrm>
-            <a:off x="9227034" y="3559058"/>
+            <a:off x="9647129" y="4244221"/>
             <a:ext cx="1641066" cy="646331"/>
           </a:xfrm>
           <a:prstGeom prst="rect">
@@ -9122,8 +9123,8 @@
         </p:nvCxnSpPr>
         <p:spPr>
           <a:xfrm flipH="1">
-            <a:off x="6465967" y="4583440"/>
-            <a:ext cx="2848948" cy="14982"/>
+            <a:off x="6385375" y="5312907"/>
+            <a:ext cx="2178522" cy="64492"/>
           </a:xfrm>
           <a:prstGeom prst="straightConnector1">
             <a:avLst/>
@@ -9155,7 +9156,7 @@
         </p:nvSpPr>
         <p:spPr>
           <a:xfrm>
-            <a:off x="9380241" y="4267765"/>
+            <a:off x="8671440" y="5021987"/>
             <a:ext cx="1641066" cy="646331"/>
           </a:xfrm>
           <a:prstGeom prst="rect">
@@ -9174,6 +9175,258 @@
               <a:t>Link to actual question</a:t>
             </a:r>
             <a:endParaRPr lang="en-PH" dirty="0"/>
+          </a:p>
+        </p:txBody>
+      </p:sp>
+      <p:sp>
+        <p:nvSpPr>
+          <p:cNvPr id="44" name="Rounded Rectangle 43"/>
+          <p:cNvSpPr/>
+          <p:nvPr/>
+        </p:nvSpPr>
+        <p:spPr>
+          <a:xfrm>
+            <a:off x="4987416" y="1481862"/>
+            <a:ext cx="2111948" cy="297765"/>
+          </a:xfrm>
+          <a:prstGeom prst="roundRect">
+            <a:avLst/>
+          </a:prstGeom>
+          <a:noFill/>
+          <a:ln>
+            <a:solidFill>
+              <a:schemeClr val="accent1">
+                <a:lumMod val="75000"/>
+              </a:schemeClr>
+            </a:solidFill>
+          </a:ln>
+        </p:spPr>
+        <p:style>
+          <a:lnRef idx="2">
+            <a:schemeClr val="accent1">
+              <a:shade val="50000"/>
+            </a:schemeClr>
+          </a:lnRef>
+          <a:fillRef idx="1">
+            <a:schemeClr val="accent1"/>
+          </a:fillRef>
+          <a:effectRef idx="0">
+            <a:schemeClr val="accent1"/>
+          </a:effectRef>
+          <a:fontRef idx="minor">
+            <a:schemeClr val="lt1"/>
+          </a:fontRef>
+        </p:style>
+        <p:txBody>
+          <a:bodyPr rtlCol="0" anchor="ctr"/>
+          <a:lstStyle/>
+          <a:p>
+            <a:r>
+              <a:rPr lang="en-PH" sz="1400" dirty="0" smtClean="0">
+                <a:solidFill>
+                  <a:schemeClr val="bg1">
+                    <a:lumMod val="75000"/>
+                  </a:schemeClr>
+                </a:solidFill>
+              </a:rPr>
+              <a:t>Dropdown - lessons</a:t>
+            </a:r>
+            <a:endParaRPr lang="en-PH" sz="1400" dirty="0">
+              <a:solidFill>
+                <a:schemeClr val="bg1">
+                  <a:lumMod val="75000"/>
+                </a:schemeClr>
+              </a:solidFill>
+            </a:endParaRPr>
+          </a:p>
+        </p:txBody>
+      </p:sp>
+      <p:sp>
+        <p:nvSpPr>
+          <p:cNvPr id="46" name="Rounded Rectangle 45"/>
+          <p:cNvSpPr/>
+          <p:nvPr/>
+        </p:nvSpPr>
+        <p:spPr>
+          <a:xfrm>
+            <a:off x="5001870" y="2146028"/>
+            <a:ext cx="2111948" cy="297765"/>
+          </a:xfrm>
+          <a:prstGeom prst="roundRect">
+            <a:avLst/>
+          </a:prstGeom>
+          <a:noFill/>
+          <a:ln>
+            <a:solidFill>
+              <a:schemeClr val="accent1">
+                <a:lumMod val="75000"/>
+              </a:schemeClr>
+            </a:solidFill>
+          </a:ln>
+        </p:spPr>
+        <p:style>
+          <a:lnRef idx="2">
+            <a:schemeClr val="accent1">
+              <a:shade val="50000"/>
+            </a:schemeClr>
+          </a:lnRef>
+          <a:fillRef idx="1">
+            <a:schemeClr val="accent1"/>
+          </a:fillRef>
+          <a:effectRef idx="0">
+            <a:schemeClr val="accent1"/>
+          </a:effectRef>
+          <a:fontRef idx="minor">
+            <a:schemeClr val="lt1"/>
+          </a:fontRef>
+        </p:style>
+        <p:txBody>
+          <a:bodyPr rtlCol="0" anchor="ctr"/>
+          <a:lstStyle/>
+          <a:p>
+            <a:r>
+              <a:rPr lang="en-PH" sz="1200" dirty="0" smtClean="0">
+                <a:solidFill>
+                  <a:schemeClr val="bg1">
+                    <a:lumMod val="75000"/>
+                  </a:schemeClr>
+                </a:solidFill>
+              </a:rPr>
+              <a:t>Dropdown – question type</a:t>
+            </a:r>
+            <a:endParaRPr lang="en-PH" sz="1200" dirty="0">
+              <a:solidFill>
+                <a:schemeClr val="bg1">
+                  <a:lumMod val="75000"/>
+                </a:schemeClr>
+              </a:solidFill>
+            </a:endParaRPr>
+          </a:p>
+        </p:txBody>
+      </p:sp>
+      <p:sp>
+        <p:nvSpPr>
+          <p:cNvPr id="47" name="Rounded Rectangle 46"/>
+          <p:cNvSpPr/>
+          <p:nvPr/>
+        </p:nvSpPr>
+        <p:spPr>
+          <a:xfrm>
+            <a:off x="4996952" y="1816645"/>
+            <a:ext cx="2111948" cy="297765"/>
+          </a:xfrm>
+          <a:prstGeom prst="roundRect">
+            <a:avLst/>
+          </a:prstGeom>
+          <a:noFill/>
+          <a:ln>
+            <a:solidFill>
+              <a:schemeClr val="accent1">
+                <a:lumMod val="75000"/>
+              </a:schemeClr>
+            </a:solidFill>
+          </a:ln>
+        </p:spPr>
+        <p:style>
+          <a:lnRef idx="2">
+            <a:schemeClr val="accent1">
+              <a:shade val="50000"/>
+            </a:schemeClr>
+          </a:lnRef>
+          <a:fillRef idx="1">
+            <a:schemeClr val="accent1"/>
+          </a:fillRef>
+          <a:effectRef idx="0">
+            <a:schemeClr val="accent1"/>
+          </a:effectRef>
+          <a:fontRef idx="minor">
+            <a:schemeClr val="lt1"/>
+          </a:fontRef>
+        </p:style>
+        <p:txBody>
+          <a:bodyPr rtlCol="0" anchor="ctr"/>
+          <a:lstStyle/>
+          <a:p>
+            <a:r>
+              <a:rPr lang="en-PH" sz="1200" dirty="0" smtClean="0">
+                <a:solidFill>
+                  <a:schemeClr val="bg1">
+                    <a:lumMod val="75000"/>
+                  </a:schemeClr>
+                </a:solidFill>
+              </a:rPr>
+              <a:t>Dropdown  - question ranges</a:t>
+            </a:r>
+            <a:endParaRPr lang="en-PH" sz="1200" dirty="0">
+              <a:solidFill>
+                <a:schemeClr val="bg1">
+                  <a:lumMod val="75000"/>
+                </a:schemeClr>
+              </a:solidFill>
+            </a:endParaRPr>
+          </a:p>
+        </p:txBody>
+      </p:sp>
+      <p:sp>
+        <p:nvSpPr>
+          <p:cNvPr id="53" name="Rounded Rectangle 52"/>
+          <p:cNvSpPr/>
+          <p:nvPr/>
+        </p:nvSpPr>
+        <p:spPr>
+          <a:xfrm>
+            <a:off x="5006789" y="2495073"/>
+            <a:ext cx="2111948" cy="297765"/>
+          </a:xfrm>
+          <a:prstGeom prst="roundRect">
+            <a:avLst/>
+          </a:prstGeom>
+          <a:noFill/>
+          <a:ln>
+            <a:solidFill>
+              <a:schemeClr val="accent1">
+                <a:lumMod val="75000"/>
+              </a:schemeClr>
+            </a:solidFill>
+          </a:ln>
+        </p:spPr>
+        <p:style>
+          <a:lnRef idx="2">
+            <a:schemeClr val="accent1">
+              <a:shade val="50000"/>
+            </a:schemeClr>
+          </a:lnRef>
+          <a:fillRef idx="1">
+            <a:schemeClr val="accent1"/>
+          </a:fillRef>
+          <a:effectRef idx="0">
+            <a:schemeClr val="accent1"/>
+          </a:effectRef>
+          <a:fontRef idx="minor">
+            <a:schemeClr val="lt1"/>
+          </a:fontRef>
+        </p:style>
+        <p:txBody>
+          <a:bodyPr rtlCol="0" anchor="ctr"/>
+          <a:lstStyle/>
+          <a:p>
+            <a:r>
+              <a:rPr lang="en-PH" sz="1200" dirty="0" smtClean="0">
+                <a:solidFill>
+                  <a:schemeClr val="bg1">
+                    <a:lumMod val="75000"/>
+                  </a:schemeClr>
+                </a:solidFill>
+              </a:rPr>
+              <a:t>Dropdown – difficulty</a:t>
+            </a:r>
+            <a:endParaRPr lang="en-PH" sz="1200" dirty="0">
+              <a:solidFill>
+                <a:schemeClr val="bg1">
+                  <a:lumMod val="75000"/>
+                </a:schemeClr>
+              </a:solidFill>
+            </a:endParaRPr>
           </a:p>
         </p:txBody>
       </p:sp>

</xml_diff>